<commit_message>
Fixed Game Over, added new textures
</commit_message>
<xml_diff>
--- a/ArkanoidUtvardering.pptx
+++ b/ArkanoidUtvardering.pptx
@@ -266,7 +266,7 @@
           <a:p>
             <a:fld id="{8E64B585-400C-455D-9535-796762DC7C0E}" type="datetimeFigureOut">
               <a:rPr lang="sv-SE" smtClean="0"/>
-              <a:t>2023-09-06</a:t>
+              <a:t>2023-09-07</a:t>
             </a:fld>
             <a:endParaRPr lang="sv-SE"/>
           </a:p>
@@ -466,7 +466,7 @@
           <a:p>
             <a:fld id="{8E64B585-400C-455D-9535-796762DC7C0E}" type="datetimeFigureOut">
               <a:rPr lang="sv-SE" smtClean="0"/>
-              <a:t>2023-09-06</a:t>
+              <a:t>2023-09-07</a:t>
             </a:fld>
             <a:endParaRPr lang="sv-SE"/>
           </a:p>
@@ -676,7 +676,7 @@
           <a:p>
             <a:fld id="{8E64B585-400C-455D-9535-796762DC7C0E}" type="datetimeFigureOut">
               <a:rPr lang="sv-SE" smtClean="0"/>
-              <a:t>2023-09-06</a:t>
+              <a:t>2023-09-07</a:t>
             </a:fld>
             <a:endParaRPr lang="sv-SE"/>
           </a:p>
@@ -876,7 +876,7 @@
           <a:p>
             <a:fld id="{8E64B585-400C-455D-9535-796762DC7C0E}" type="datetimeFigureOut">
               <a:rPr lang="sv-SE" smtClean="0"/>
-              <a:t>2023-09-06</a:t>
+              <a:t>2023-09-07</a:t>
             </a:fld>
             <a:endParaRPr lang="sv-SE"/>
           </a:p>
@@ -1152,7 +1152,7 @@
           <a:p>
             <a:fld id="{8E64B585-400C-455D-9535-796762DC7C0E}" type="datetimeFigureOut">
               <a:rPr lang="sv-SE" smtClean="0"/>
-              <a:t>2023-09-06</a:t>
+              <a:t>2023-09-07</a:t>
             </a:fld>
             <a:endParaRPr lang="sv-SE"/>
           </a:p>
@@ -1420,7 +1420,7 @@
           <a:p>
             <a:fld id="{8E64B585-400C-455D-9535-796762DC7C0E}" type="datetimeFigureOut">
               <a:rPr lang="sv-SE" smtClean="0"/>
-              <a:t>2023-09-06</a:t>
+              <a:t>2023-09-07</a:t>
             </a:fld>
             <a:endParaRPr lang="sv-SE"/>
           </a:p>
@@ -1835,7 +1835,7 @@
           <a:p>
             <a:fld id="{8E64B585-400C-455D-9535-796762DC7C0E}" type="datetimeFigureOut">
               <a:rPr lang="sv-SE" smtClean="0"/>
-              <a:t>2023-09-06</a:t>
+              <a:t>2023-09-07</a:t>
             </a:fld>
             <a:endParaRPr lang="sv-SE"/>
           </a:p>
@@ -1977,7 +1977,7 @@
           <a:p>
             <a:fld id="{8E64B585-400C-455D-9535-796762DC7C0E}" type="datetimeFigureOut">
               <a:rPr lang="sv-SE" smtClean="0"/>
-              <a:t>2023-09-06</a:t>
+              <a:t>2023-09-07</a:t>
             </a:fld>
             <a:endParaRPr lang="sv-SE"/>
           </a:p>
@@ -2090,7 +2090,7 @@
           <a:p>
             <a:fld id="{8E64B585-400C-455D-9535-796762DC7C0E}" type="datetimeFigureOut">
               <a:rPr lang="sv-SE" smtClean="0"/>
-              <a:t>2023-09-06</a:t>
+              <a:t>2023-09-07</a:t>
             </a:fld>
             <a:endParaRPr lang="sv-SE"/>
           </a:p>
@@ -2403,7 +2403,7 @@
           <a:p>
             <a:fld id="{8E64B585-400C-455D-9535-796762DC7C0E}" type="datetimeFigureOut">
               <a:rPr lang="sv-SE" smtClean="0"/>
-              <a:t>2023-09-06</a:t>
+              <a:t>2023-09-07</a:t>
             </a:fld>
             <a:endParaRPr lang="sv-SE"/>
           </a:p>
@@ -2692,7 +2692,7 @@
           <a:p>
             <a:fld id="{8E64B585-400C-455D-9535-796762DC7C0E}" type="datetimeFigureOut">
               <a:rPr lang="sv-SE" smtClean="0"/>
-              <a:t>2023-09-06</a:t>
+              <a:t>2023-09-07</a:t>
             </a:fld>
             <a:endParaRPr lang="sv-SE"/>
           </a:p>
@@ -2935,7 +2935,7 @@
           <a:p>
             <a:fld id="{8E64B585-400C-455D-9535-796762DC7C0E}" type="datetimeFigureOut">
               <a:rPr lang="sv-SE" smtClean="0"/>
-              <a:t>2023-09-06</a:t>
+              <a:t>2023-09-07</a:t>
             </a:fld>
             <a:endParaRPr lang="sv-SE"/>
           </a:p>
@@ -3969,7 +3969,7 @@
         <p:spPr>
           <a:xfrm>
             <a:off x="1055440" y="1772816"/>
-            <a:ext cx="10081120" cy="923330"/>
+            <a:ext cx="10081120" cy="1754326"/>
           </a:xfrm>
           <a:prstGeom prst="rect">
             <a:avLst/>
@@ -3989,6 +3989,25 @@
           </a:p>
           <a:p>
             <a:endParaRPr lang="sv-SE" dirty="0"/>
+          </a:p>
+          <a:p>
+            <a:endParaRPr lang="sv-SE" dirty="0"/>
+          </a:p>
+          <a:p>
+            <a:r>
+              <a:rPr lang="sv-SE" dirty="0"/>
+              <a:t>Assets:</a:t>
+            </a:r>
+          </a:p>
+          <a:p>
+            <a:pPr marL="285750" indent="-285750">
+              <a:buFont typeface="Arial" panose="020B0604020202020204" pitchFamily="34" charset="0"/>
+              <a:buChar char="•"/>
+            </a:pPr>
+            <a:r>
+              <a:rPr lang="sv-SE" dirty="0"/>
+              <a:t>https://assetstore.unity.com/packages/2d/textures-materials/metals/stylize-metal-texture-153572</a:t>
+            </a:r>
           </a:p>
         </p:txBody>
       </p:sp>

</xml_diff>